<commit_message>
Update NASA SPACE APP - LEVERAGING AI - Team Marine Saviours.pptx
</commit_message>
<xml_diff>
--- a/NASA SPACE APP - LEVERAGING AI - Team Marine Saviours.pptx
+++ b/NASA SPACE APP - LEVERAGING AI - Team Marine Saviours.pptx
@@ -5,18 +5,20 @@
     <p:sldMasterId id="2147483660" r:id="rId4"/>
   </p:sldMasterIdLst>
   <p:notesMasterIdLst>
-    <p:notesMasterId r:id="rId11"/>
+    <p:notesMasterId r:id="rId13"/>
   </p:notesMasterIdLst>
   <p:handoutMasterIdLst>
-    <p:handoutMasterId r:id="rId12"/>
+    <p:handoutMasterId r:id="rId14"/>
   </p:handoutMasterIdLst>
   <p:sldIdLst>
     <p:sldId id="256" r:id="rId5"/>
     <p:sldId id="281" r:id="rId6"/>
-    <p:sldId id="271" r:id="rId7"/>
-    <p:sldId id="257" r:id="rId8"/>
-    <p:sldId id="282" r:id="rId9"/>
-    <p:sldId id="283" r:id="rId10"/>
+    <p:sldId id="284" r:id="rId7"/>
+    <p:sldId id="271" r:id="rId8"/>
+    <p:sldId id="257" r:id="rId9"/>
+    <p:sldId id="285" r:id="rId10"/>
+    <p:sldId id="282" r:id="rId11"/>
+    <p:sldId id="283" r:id="rId12"/>
   </p:sldIdLst>
   <p:sldSz cx="12192000" cy="6858000"/>
   <p:notesSz cx="6858000" cy="9144000"/>
@@ -126,8 +128,10 @@
         <p14:section name="Design, Morph, Annotate, Work Together, Tell Me" id="{B9B51309-D148-4332-87C2-07BE32FBCA3B}">
           <p14:sldIdLst>
             <p14:sldId id="281"/>
+            <p14:sldId id="284"/>
             <p14:sldId id="271"/>
             <p14:sldId id="257"/>
+            <p14:sldId id="285"/>
             <p14:sldId id="282"/>
             <p14:sldId id="283"/>
           </p14:sldIdLst>
@@ -246,7 +250,7 @@
           <a:p>
             <a:fld id="{80680FBE-A8DF-4758-9AC4-3A9E1039168F}" type="datetimeFigureOut">
               <a:rPr lang="en-US" smtClean="0"/>
-              <a:t>10/3/2021</a:t>
+              <a:t>10/4/2021</a:t>
             </a:fld>
             <a:endParaRPr lang="en-US" dirty="0"/>
           </a:p>
@@ -519,7 +523,7 @@
           <a:p>
             <a:fld id="{EC13577B-6902-467D-A26C-08A0DD5E4E03}" type="datetimeFigureOut">
               <a:rPr lang="en-US" smtClean="0"/>
-              <a:t>10/3/2021</a:t>
+              <a:t>10/4/2021</a:t>
             </a:fld>
             <a:endParaRPr lang="en-US" dirty="0"/>
           </a:p>
@@ -1314,7 +1318,7 @@
             <a:fld id="{8BEEBAAA-29B5-4AF5-BC5F-7E580C29002D}" type="datetimeFigureOut">
               <a:rPr lang="en-US" smtClean="0"/>
               <a:pPr/>
-              <a:t>10/3/2021</a:t>
+              <a:t>10/4/2021</a:t>
             </a:fld>
             <a:endParaRPr lang="en-US" dirty="0"/>
           </a:p>
@@ -1940,7 +1944,7 @@
             <a:fld id="{8BEEBAAA-29B5-4AF5-BC5F-7E580C29002D}" type="datetimeFigureOut">
               <a:rPr lang="en-US" smtClean="0"/>
               <a:pPr/>
-              <a:t>10/3/2021</a:t>
+              <a:t>10/4/2021</a:t>
             </a:fld>
             <a:endParaRPr lang="en-US" dirty="0"/>
           </a:p>
@@ -2997,6 +3001,111 @@
       </p:grpSpPr>
       <p:sp>
         <p:nvSpPr>
+          <p:cNvPr id="2" name="Title 1">
+            <a:extLst>
+              <a:ext uri="{FF2B5EF4-FFF2-40B4-BE49-F238E27FC236}">
+                <a16:creationId xmlns:a16="http://schemas.microsoft.com/office/drawing/2014/main" id="{3DC67C87-6E0B-451C-A152-79CA5E6BC2A2}"/>
+              </a:ext>
+            </a:extLst>
+          </p:cNvPr>
+          <p:cNvSpPr>
+            <a:spLocks noGrp="1"/>
+          </p:cNvSpPr>
+          <p:nvPr>
+            <p:ph type="title"/>
+          </p:nvPr>
+        </p:nvSpPr>
+        <p:spPr/>
+        <p:txBody>
+          <a:bodyPr>
+            <a:normAutofit/>
+          </a:bodyPr>
+          <a:lstStyle/>
+          <a:p>
+            <a:pPr rtl="0">
+              <a:spcBef>
+                <a:spcPts val="0"/>
+              </a:spcBef>
+              <a:spcAft>
+                <a:spcPts val="0"/>
+              </a:spcAft>
+            </a:pPr>
+            <a:r>
+              <a:rPr lang="en-US" sz="1800" b="0" i="0" u="none" strike="noStrike" dirty="0">
+                <a:solidFill>
+                  <a:srgbClr val="3A3838"/>
+                </a:solidFill>
+                <a:effectLst/>
+                <a:latin typeface="Quattrocento Sans"/>
+              </a:rPr>
+              <a:t>High Level Block Diagram</a:t>
+            </a:r>
+            <a:endParaRPr lang="en-US" dirty="0"/>
+          </a:p>
+        </p:txBody>
+      </p:sp>
+      <p:pic>
+        <p:nvPicPr>
+          <p:cNvPr id="7" name="Picture 6">
+            <a:extLst>
+              <a:ext uri="{FF2B5EF4-FFF2-40B4-BE49-F238E27FC236}">
+                <a16:creationId xmlns:a16="http://schemas.microsoft.com/office/drawing/2014/main" id="{2B04CFF5-9F37-4BEC-9D13-810521A73717}"/>
+              </a:ext>
+            </a:extLst>
+          </p:cNvPr>
+          <p:cNvPicPr>
+            <a:picLocks noChangeAspect="1"/>
+          </p:cNvPicPr>
+          <p:nvPr/>
+        </p:nvPicPr>
+        <p:blipFill>
+          <a:blip r:embed="rId2"/>
+          <a:stretch>
+            <a:fillRect/>
+          </a:stretch>
+        </p:blipFill>
+        <p:spPr>
+          <a:xfrm>
+            <a:off x="418234" y="1474367"/>
+            <a:ext cx="10191750" cy="4619625"/>
+          </a:xfrm>
+          <a:prstGeom prst="rect">
+            <a:avLst/>
+          </a:prstGeom>
+        </p:spPr>
+      </p:pic>
+    </p:spTree>
+    <p:extLst>
+      <p:ext uri="{BB962C8B-B14F-4D97-AF65-F5344CB8AC3E}">
+        <p14:creationId xmlns:p14="http://schemas.microsoft.com/office/powerpoint/2010/main" val="3115436352"/>
+      </p:ext>
+    </p:extLst>
+  </p:cSld>
+  <p:clrMapOvr>
+    <a:masterClrMapping/>
+  </p:clrMapOvr>
+</p:sld>
+</file>
+
+<file path=ppt/slides/slide4.xml><?xml version="1.0" encoding="utf-8"?>
+<p:sld xmlns:a="http://schemas.openxmlformats.org/drawingml/2006/main" xmlns:r="http://schemas.openxmlformats.org/officeDocument/2006/relationships" xmlns:p="http://schemas.openxmlformats.org/presentationml/2006/main">
+  <p:cSld>
+    <p:spTree>
+      <p:nvGrpSpPr>
+        <p:cNvPr id="1" name=""/>
+        <p:cNvGrpSpPr/>
+        <p:nvPr/>
+      </p:nvGrpSpPr>
+      <p:grpSpPr>
+        <a:xfrm>
+          <a:off x="0" y="0"/>
+          <a:ext cx="0" cy="0"/>
+          <a:chOff x="0" y="0"/>
+          <a:chExt cx="0" cy="0"/>
+        </a:xfrm>
+      </p:grpSpPr>
+      <p:sp>
+        <p:nvSpPr>
           <p:cNvPr id="8" name="Title 7"/>
           <p:cNvSpPr>
             <a:spLocks noGrp="1"/>
@@ -3372,7 +3481,7 @@
 </p:sld>
 </file>
 
-<file path=ppt/slides/slide4.xml><?xml version="1.0" encoding="utf-8"?>
+<file path=ppt/slides/slide5.xml><?xml version="1.0" encoding="utf-8"?>
 <p:sld xmlns:a="http://schemas.openxmlformats.org/drawingml/2006/main" xmlns:r="http://schemas.openxmlformats.org/officeDocument/2006/relationships" xmlns:p="http://schemas.openxmlformats.org/presentationml/2006/main">
   <p:cSld>
     <p:spTree>
@@ -5244,7 +5353,529 @@
 </p:sld>
 </file>
 
-<file path=ppt/slides/slide5.xml><?xml version="1.0" encoding="utf-8"?>
+<file path=ppt/slides/slide6.xml><?xml version="1.0" encoding="utf-8"?>
+<p:sld xmlns:a="http://schemas.openxmlformats.org/drawingml/2006/main" xmlns:r="http://schemas.openxmlformats.org/officeDocument/2006/relationships" xmlns:p="http://schemas.openxmlformats.org/presentationml/2006/main">
+  <p:cSld>
+    <p:spTree>
+      <p:nvGrpSpPr>
+        <p:cNvPr id="1" name=""/>
+        <p:cNvGrpSpPr/>
+        <p:nvPr/>
+      </p:nvGrpSpPr>
+      <p:grpSpPr>
+        <a:xfrm>
+          <a:off x="0" y="0"/>
+          <a:ext cx="0" cy="0"/>
+          <a:chOff x="0" y="0"/>
+          <a:chExt cx="0" cy="0"/>
+        </a:xfrm>
+      </p:grpSpPr>
+      <p:sp>
+        <p:nvSpPr>
+          <p:cNvPr id="2" name="Title 1">
+            <a:extLst>
+              <a:ext uri="{FF2B5EF4-FFF2-40B4-BE49-F238E27FC236}">
+                <a16:creationId xmlns:a16="http://schemas.microsoft.com/office/drawing/2014/main" id="{B8F7D817-80DF-4B11-804C-F808BBF41656}"/>
+              </a:ext>
+            </a:extLst>
+          </p:cNvPr>
+          <p:cNvSpPr>
+            <a:spLocks noGrp="1"/>
+          </p:cNvSpPr>
+          <p:nvPr>
+            <p:ph type="title"/>
+          </p:nvPr>
+        </p:nvSpPr>
+        <p:spPr/>
+        <p:txBody>
+          <a:bodyPr/>
+          <a:lstStyle/>
+          <a:p>
+            <a:r>
+              <a:rPr lang="en-US" dirty="0"/>
+              <a:t>Tools Used</a:t>
+            </a:r>
+          </a:p>
+        </p:txBody>
+      </p:sp>
+      <p:sp>
+        <p:nvSpPr>
+          <p:cNvPr id="5" name="TextBox 4">
+            <a:extLst>
+              <a:ext uri="{FF2B5EF4-FFF2-40B4-BE49-F238E27FC236}">
+                <a16:creationId xmlns:a16="http://schemas.microsoft.com/office/drawing/2014/main" id="{21D6E0C2-234F-4802-8EF2-6A64C43C8218}"/>
+              </a:ext>
+            </a:extLst>
+          </p:cNvPr>
+          <p:cNvSpPr txBox="1"/>
+          <p:nvPr/>
+        </p:nvSpPr>
+        <p:spPr>
+          <a:xfrm>
+            <a:off x="468308" y="1422238"/>
+            <a:ext cx="11149585" cy="5493812"/>
+          </a:xfrm>
+          <a:prstGeom prst="rect">
+            <a:avLst/>
+          </a:prstGeom>
+          <a:noFill/>
+        </p:spPr>
+        <p:txBody>
+          <a:bodyPr wrap="square">
+            <a:spAutoFit/>
+          </a:bodyPr>
+          <a:lstStyle/>
+          <a:p>
+            <a:pPr rtl="0">
+              <a:spcBef>
+                <a:spcPts val="0"/>
+              </a:spcBef>
+              <a:spcAft>
+                <a:spcPts val="1800"/>
+              </a:spcAft>
+            </a:pPr>
+            <a:r>
+              <a:rPr lang="en-US" sz="1800" b="0" i="0" u="none" strike="noStrike" dirty="0">
+                <a:solidFill>
+                  <a:srgbClr val="4A5350"/>
+                </a:solidFill>
+                <a:effectLst/>
+                <a:latin typeface="Arial" panose="020B0604020202020204" pitchFamily="34" charset="0"/>
+              </a:rPr>
+              <a:t>Dataset used: Sentinel 2 L1C - </a:t>
+            </a:r>
+            <a:r>
+              <a:rPr lang="en-US" sz="1800" b="0" i="0" u="sng" strike="noStrike" dirty="0">
+                <a:solidFill>
+                  <a:srgbClr val="0563C1"/>
+                </a:solidFill>
+                <a:effectLst/>
+                <a:latin typeface="Arial" panose="020B0604020202020204" pitchFamily="34" charset="0"/>
+                <a:hlinkClick r:id="rId2"/>
+              </a:rPr>
+              <a:t>https://sentinel.esa.int/web/sentinel/missions/sentinel-2</a:t>
+            </a:r>
+            <a:r>
+              <a:rPr lang="en-US" sz="1800" b="0" i="0" u="none" strike="noStrike" dirty="0">
+                <a:solidFill>
+                  <a:srgbClr val="4A5350"/>
+                </a:solidFill>
+                <a:effectLst/>
+                <a:latin typeface="Arial" panose="020B0604020202020204" pitchFamily="34" charset="0"/>
+              </a:rPr>
+              <a:t> </a:t>
+            </a:r>
+            <a:endParaRPr lang="en-US" b="0" dirty="0">
+              <a:effectLst/>
+            </a:endParaRPr>
+          </a:p>
+          <a:p>
+            <a:pPr rtl="0">
+              <a:spcBef>
+                <a:spcPts val="0"/>
+              </a:spcBef>
+              <a:spcAft>
+                <a:spcPts val="1800"/>
+              </a:spcAft>
+            </a:pPr>
+            <a:r>
+              <a:rPr lang="en-US" sz="1800" b="0" i="0" u="none" strike="noStrike" dirty="0">
+                <a:solidFill>
+                  <a:srgbClr val="4A5350"/>
+                </a:solidFill>
+                <a:effectLst/>
+                <a:latin typeface="Arial" panose="020B0604020202020204" pitchFamily="34" charset="0"/>
+              </a:rPr>
+              <a:t>Hardware used: Google </a:t>
+            </a:r>
+            <a:r>
+              <a:rPr lang="en-US" sz="1800" b="0" i="0" u="none" strike="noStrike" dirty="0" err="1">
+                <a:solidFill>
+                  <a:srgbClr val="4A5350"/>
+                </a:solidFill>
+                <a:effectLst/>
+                <a:latin typeface="Arial" panose="020B0604020202020204" pitchFamily="34" charset="0"/>
+              </a:rPr>
+              <a:t>Colab</a:t>
+            </a:r>
+            <a:r>
+              <a:rPr lang="en-US" sz="1800" b="0" i="0" u="none" strike="noStrike" dirty="0">
+                <a:solidFill>
+                  <a:srgbClr val="4A5350"/>
+                </a:solidFill>
+                <a:effectLst/>
+                <a:latin typeface="Arial" panose="020B0604020202020204" pitchFamily="34" charset="0"/>
+              </a:rPr>
+              <a:t> Notebooks (</a:t>
+            </a:r>
+            <a:r>
+              <a:rPr lang="en-US" sz="1800" b="0" i="0" u="sng" strike="noStrike" dirty="0">
+                <a:solidFill>
+                  <a:srgbClr val="0563C1"/>
+                </a:solidFill>
+                <a:effectLst/>
+                <a:latin typeface="Arial" panose="020B0604020202020204" pitchFamily="34" charset="0"/>
+                <a:hlinkClick r:id="rId3"/>
+              </a:rPr>
+              <a:t>https://colab.research.google.com/</a:t>
+            </a:r>
+            <a:r>
+              <a:rPr lang="en-US" sz="1800" b="0" i="0" u="none" strike="noStrike" dirty="0">
+                <a:solidFill>
+                  <a:srgbClr val="4A5350"/>
+                </a:solidFill>
+                <a:effectLst/>
+                <a:latin typeface="Arial" panose="020B0604020202020204" pitchFamily="34" charset="0"/>
+              </a:rPr>
+              <a:t>) </a:t>
+            </a:r>
+            <a:endParaRPr lang="en-US" b="0" dirty="0">
+              <a:effectLst/>
+            </a:endParaRPr>
+          </a:p>
+          <a:p>
+            <a:pPr rtl="0">
+              <a:spcBef>
+                <a:spcPts val="0"/>
+              </a:spcBef>
+              <a:spcAft>
+                <a:spcPts val="1800"/>
+              </a:spcAft>
+            </a:pPr>
+            <a:r>
+              <a:rPr lang="en-US" sz="1800" b="0" i="0" u="none" strike="noStrike" dirty="0">
+                <a:solidFill>
+                  <a:srgbClr val="4A5350"/>
+                </a:solidFill>
+                <a:effectLst/>
+                <a:latin typeface="Arial" panose="020B0604020202020204" pitchFamily="34" charset="0"/>
+              </a:rPr>
+              <a:t>Software used: Python (</a:t>
+            </a:r>
+            <a:r>
+              <a:rPr lang="en-US" sz="1800" b="0" i="0" u="none" strike="noStrike" dirty="0" err="1">
+                <a:solidFill>
+                  <a:srgbClr val="4A5350"/>
+                </a:solidFill>
+                <a:effectLst/>
+                <a:latin typeface="Arial" panose="020B0604020202020204" pitchFamily="34" charset="0"/>
+              </a:rPr>
+              <a:t>Jupyter</a:t>
+            </a:r>
+            <a:r>
+              <a:rPr lang="en-US" sz="1800" b="0" i="0" u="none" strike="noStrike" dirty="0">
+                <a:solidFill>
+                  <a:srgbClr val="4A5350"/>
+                </a:solidFill>
+                <a:effectLst/>
+                <a:latin typeface="Arial" panose="020B0604020202020204" pitchFamily="34" charset="0"/>
+              </a:rPr>
+              <a:t>, EO Learn, </a:t>
+            </a:r>
+            <a:r>
+              <a:rPr lang="en-US" sz="1800" b="0" i="0" u="none" strike="noStrike" dirty="0" err="1">
+                <a:solidFill>
+                  <a:srgbClr val="4A5350"/>
+                </a:solidFill>
+                <a:effectLst/>
+                <a:latin typeface="Arial" panose="020B0604020202020204" pitchFamily="34" charset="0"/>
+              </a:rPr>
+              <a:t>rasterio</a:t>
+            </a:r>
+            <a:r>
+              <a:rPr lang="en-US" sz="1800" b="0" i="0" u="none" strike="noStrike" dirty="0">
+                <a:solidFill>
+                  <a:srgbClr val="4A5350"/>
+                </a:solidFill>
+                <a:effectLst/>
+                <a:latin typeface="Arial" panose="020B0604020202020204" pitchFamily="34" charset="0"/>
+              </a:rPr>
+              <a:t>, </a:t>
+            </a:r>
+            <a:r>
+              <a:rPr lang="en-US" sz="1800" b="0" i="0" u="none" strike="noStrike" dirty="0" err="1">
+                <a:solidFill>
+                  <a:srgbClr val="4A5350"/>
+                </a:solidFill>
+                <a:effectLst/>
+                <a:latin typeface="Arial" panose="020B0604020202020204" pitchFamily="34" charset="0"/>
+              </a:rPr>
+              <a:t>geopandas</a:t>
+            </a:r>
+            <a:r>
+              <a:rPr lang="en-US" sz="1800" b="0" i="0" u="none" strike="noStrike" dirty="0">
+                <a:solidFill>
+                  <a:srgbClr val="4A5350"/>
+                </a:solidFill>
+                <a:effectLst/>
+                <a:latin typeface="Arial" panose="020B0604020202020204" pitchFamily="34" charset="0"/>
+              </a:rPr>
+              <a:t>)</a:t>
+            </a:r>
+            <a:endParaRPr lang="en-US" b="0" dirty="0">
+              <a:effectLst/>
+            </a:endParaRPr>
+          </a:p>
+          <a:p>
+            <a:pPr rtl="0">
+              <a:spcBef>
+                <a:spcPts val="0"/>
+              </a:spcBef>
+              <a:spcAft>
+                <a:spcPts val="1800"/>
+              </a:spcAft>
+            </a:pPr>
+            <a:r>
+              <a:rPr lang="en-US" sz="1800" b="0" i="0" u="none" strike="noStrike" dirty="0" err="1">
+                <a:solidFill>
+                  <a:srgbClr val="4A5350"/>
+                </a:solidFill>
+                <a:effectLst/>
+                <a:latin typeface="Arial" panose="020B0604020202020204" pitchFamily="34" charset="0"/>
+              </a:rPr>
+              <a:t>Sentinelhub</a:t>
+            </a:r>
+            <a:r>
+              <a:rPr lang="en-US" sz="1800" b="0" i="0" u="none" strike="noStrike" dirty="0">
+                <a:solidFill>
+                  <a:srgbClr val="4A5350"/>
+                </a:solidFill>
+                <a:effectLst/>
+                <a:latin typeface="Arial" panose="020B0604020202020204" pitchFamily="34" charset="0"/>
+              </a:rPr>
+              <a:t> APIs - </a:t>
+            </a:r>
+            <a:r>
+              <a:rPr lang="en-US" sz="1800" b="0" i="0" u="sng" strike="noStrike" dirty="0">
+                <a:solidFill>
+                  <a:srgbClr val="0563C1"/>
+                </a:solidFill>
+                <a:effectLst/>
+                <a:latin typeface="Arial" panose="020B0604020202020204" pitchFamily="34" charset="0"/>
+                <a:hlinkClick r:id="rId4"/>
+              </a:rPr>
+              <a:t>https://www.sentinel-hub.com/</a:t>
+            </a:r>
+            <a:r>
+              <a:rPr lang="en-US" sz="1800" b="0" i="0" u="none" strike="noStrike" dirty="0">
+                <a:solidFill>
+                  <a:srgbClr val="4A5350"/>
+                </a:solidFill>
+                <a:effectLst/>
+                <a:latin typeface="Arial" panose="020B0604020202020204" pitchFamily="34" charset="0"/>
+              </a:rPr>
+              <a:t>  </a:t>
+            </a:r>
+            <a:endParaRPr lang="en-US" b="0" dirty="0">
+              <a:effectLst/>
+            </a:endParaRPr>
+          </a:p>
+          <a:p>
+            <a:pPr rtl="0">
+              <a:spcBef>
+                <a:spcPts val="0"/>
+              </a:spcBef>
+              <a:spcAft>
+                <a:spcPts val="1800"/>
+              </a:spcAft>
+            </a:pPr>
+            <a:r>
+              <a:rPr lang="en-US" sz="1800" b="0" i="0" u="none" strike="noStrike" dirty="0">
+                <a:solidFill>
+                  <a:srgbClr val="4A5350"/>
+                </a:solidFill>
+                <a:effectLst/>
+                <a:latin typeface="Arial" panose="020B0604020202020204" pitchFamily="34" charset="0"/>
+              </a:rPr>
+              <a:t>Sentinel Hub web browser - </a:t>
+            </a:r>
+            <a:r>
+              <a:rPr lang="en-US" sz="1800" b="0" i="0" u="sng" strike="noStrike" dirty="0">
+                <a:solidFill>
+                  <a:srgbClr val="0563C1"/>
+                </a:solidFill>
+                <a:effectLst/>
+                <a:latin typeface="Arial" panose="020B0604020202020204" pitchFamily="34" charset="0"/>
+                <a:hlinkClick r:id="rId5"/>
+              </a:rPr>
+              <a:t>https://scihub.copernicus.eu/dhus/#/home</a:t>
+            </a:r>
+            <a:r>
+              <a:rPr lang="en-US" sz="1800" b="0" i="0" u="none" strike="noStrike" dirty="0">
+                <a:solidFill>
+                  <a:srgbClr val="4A5350"/>
+                </a:solidFill>
+                <a:effectLst/>
+                <a:latin typeface="Arial" panose="020B0604020202020204" pitchFamily="34" charset="0"/>
+              </a:rPr>
+              <a:t> </a:t>
+            </a:r>
+            <a:endParaRPr lang="en-US" b="0" dirty="0">
+              <a:effectLst/>
+            </a:endParaRPr>
+          </a:p>
+          <a:p>
+            <a:pPr rtl="0">
+              <a:spcBef>
+                <a:spcPts val="0"/>
+              </a:spcBef>
+              <a:spcAft>
+                <a:spcPts val="1800"/>
+              </a:spcAft>
+            </a:pPr>
+            <a:r>
+              <a:rPr lang="en-US" sz="1800" b="0" i="0" u="none" strike="noStrike" dirty="0">
+                <a:solidFill>
+                  <a:srgbClr val="4A5350"/>
+                </a:solidFill>
+                <a:effectLst/>
+                <a:latin typeface="Arial" panose="020B0604020202020204" pitchFamily="34" charset="0"/>
+              </a:rPr>
+              <a:t>Apache Superset - </a:t>
+            </a:r>
+            <a:r>
+              <a:rPr lang="en-US" sz="1800" b="0" i="0" u="sng" strike="noStrike" dirty="0">
+                <a:solidFill>
+                  <a:srgbClr val="0563C1"/>
+                </a:solidFill>
+                <a:effectLst/>
+                <a:latin typeface="Arial" panose="020B0604020202020204" pitchFamily="34" charset="0"/>
+                <a:hlinkClick r:id="rId6"/>
+              </a:rPr>
+              <a:t>https://superset.apache.org/</a:t>
+            </a:r>
+            <a:r>
+              <a:rPr lang="en-US" sz="1800" b="0" i="0" u="none" strike="noStrike" dirty="0">
+                <a:solidFill>
+                  <a:srgbClr val="4A5350"/>
+                </a:solidFill>
+                <a:effectLst/>
+                <a:latin typeface="Arial" panose="020B0604020202020204" pitchFamily="34" charset="0"/>
+              </a:rPr>
+              <a:t> </a:t>
+            </a:r>
+            <a:endParaRPr lang="en-US" b="0" dirty="0">
+              <a:effectLst/>
+            </a:endParaRPr>
+          </a:p>
+          <a:p>
+            <a:pPr rtl="0">
+              <a:spcBef>
+                <a:spcPts val="0"/>
+              </a:spcBef>
+              <a:spcAft>
+                <a:spcPts val="1800"/>
+              </a:spcAft>
+            </a:pPr>
+            <a:br>
+              <a:rPr lang="en-US" b="0" dirty="0">
+                <a:effectLst/>
+              </a:rPr>
+            </a:br>
+            <a:r>
+              <a:rPr lang="en-US" sz="1800" b="0" i="0" u="none" strike="noStrike" dirty="0">
+                <a:solidFill>
+                  <a:srgbClr val="4A5350"/>
+                </a:solidFill>
+                <a:effectLst/>
+                <a:latin typeface="Arial" panose="020B0604020202020204" pitchFamily="34" charset="0"/>
+              </a:rPr>
+              <a:t>References</a:t>
+            </a:r>
+            <a:endParaRPr lang="en-US" b="0" dirty="0">
+              <a:effectLst/>
+            </a:endParaRPr>
+          </a:p>
+          <a:p>
+            <a:pPr rtl="0">
+              <a:spcBef>
+                <a:spcPts val="0"/>
+              </a:spcBef>
+              <a:spcAft>
+                <a:spcPts val="1800"/>
+              </a:spcAft>
+            </a:pPr>
+            <a:r>
+              <a:rPr lang="en-US" sz="1800" b="0" i="0" u="sng" strike="noStrike" dirty="0">
+                <a:solidFill>
+                  <a:srgbClr val="0563C1"/>
+                </a:solidFill>
+                <a:effectLst/>
+                <a:latin typeface="Arial" panose="020B0604020202020204" pitchFamily="34" charset="0"/>
+                <a:hlinkClick r:id="rId7"/>
+              </a:rPr>
+              <a:t>https://www.nature.com/articles/s41598-020-62298-z</a:t>
+            </a:r>
+            <a:r>
+              <a:rPr lang="en-US" sz="1800" b="0" i="0" u="none" strike="noStrike" dirty="0">
+                <a:solidFill>
+                  <a:srgbClr val="4A5350"/>
+                </a:solidFill>
+                <a:effectLst/>
+                <a:latin typeface="Arial" panose="020B0604020202020204" pitchFamily="34" charset="0"/>
+              </a:rPr>
+              <a:t> </a:t>
+            </a:r>
+            <a:endParaRPr lang="en-US" b="0" dirty="0">
+              <a:effectLst/>
+            </a:endParaRPr>
+          </a:p>
+          <a:p>
+            <a:pPr rtl="0">
+              <a:spcBef>
+                <a:spcPts val="0"/>
+              </a:spcBef>
+              <a:spcAft>
+                <a:spcPts val="1800"/>
+              </a:spcAft>
+            </a:pPr>
+            <a:r>
+              <a:rPr lang="en-US" sz="1800" b="0" i="0" u="sng" strike="noStrike" dirty="0">
+                <a:solidFill>
+                  <a:srgbClr val="0563C1"/>
+                </a:solidFill>
+                <a:effectLst/>
+                <a:latin typeface="Arial" panose="020B0604020202020204" pitchFamily="34" charset="0"/>
+                <a:hlinkClick r:id="rId8"/>
+              </a:rPr>
+              <a:t>https://www.mdpi.com/2072-4292/13/17/3401/htm</a:t>
+            </a:r>
+            <a:r>
+              <a:rPr lang="en-US" sz="1800" b="0" i="0" u="none" strike="noStrike" dirty="0">
+                <a:solidFill>
+                  <a:srgbClr val="4A5350"/>
+                </a:solidFill>
+                <a:effectLst/>
+                <a:latin typeface="Arial" panose="020B0604020202020204" pitchFamily="34" charset="0"/>
+              </a:rPr>
+              <a:t> </a:t>
+            </a:r>
+            <a:endParaRPr lang="en-US" b="0" dirty="0">
+              <a:effectLst/>
+            </a:endParaRPr>
+          </a:p>
+          <a:p>
+            <a:br>
+              <a:rPr lang="en-US" dirty="0"/>
+            </a:br>
+            <a:endParaRPr lang="en-US" dirty="0"/>
+          </a:p>
+        </p:txBody>
+      </p:sp>
+    </p:spTree>
+    <p:extLst>
+      <p:ext uri="{BB962C8B-B14F-4D97-AF65-F5344CB8AC3E}">
+        <p14:creationId xmlns:p14="http://schemas.microsoft.com/office/powerpoint/2010/main" val="2913198550"/>
+      </p:ext>
+    </p:extLst>
+  </p:cSld>
+  <p:clrMapOvr>
+    <a:masterClrMapping/>
+  </p:clrMapOvr>
+</p:sld>
+</file>
+
+<file path=ppt/slides/slide7.xml><?xml version="1.0" encoding="utf-8"?>
 <p:sld xmlns:a="http://schemas.openxmlformats.org/drawingml/2006/main" xmlns:r="http://schemas.openxmlformats.org/officeDocument/2006/relationships" xmlns:p="http://schemas.openxmlformats.org/presentationml/2006/main">
   <p:cSld>
     <p:spTree>
@@ -5691,7 +6322,7 @@
 </p:sld>
 </file>
 
-<file path=ppt/slides/slide6.xml><?xml version="1.0" encoding="utf-8"?>
+<file path=ppt/slides/slide8.xml><?xml version="1.0" encoding="utf-8"?>
 <p:sld xmlns:a="http://schemas.openxmlformats.org/drawingml/2006/main" xmlns:r="http://schemas.openxmlformats.org/officeDocument/2006/relationships" xmlns:p="http://schemas.openxmlformats.org/presentationml/2006/main">
   <p:cSld>
     <p:spTree>
@@ -6572,6 +7203,34 @@
 </file>
 
 <file path=customXml/item1.xml><?xml version="1.0" encoding="utf-8"?>
+<p:properties xmlns:p="http://schemas.microsoft.com/office/2006/metadata/properties" xmlns:xsi="http://www.w3.org/2001/XMLSchema-instance" xmlns:pc="http://schemas.microsoft.com/office/infopath/2007/PartnerControls">
+  <documentManagement>
+    <_ip_UnifiedCompliancePolicyUIAction xmlns="http://schemas.microsoft.com/sharepoint/v3" xsi:nil="true"/>
+    <Image xmlns="71af3243-3dd4-4a8d-8c0d-dd76da1f02a5">
+      <Url xsi:nil="true"/>
+      <Description xsi:nil="true"/>
+    </Image>
+    <Status xmlns="71af3243-3dd4-4a8d-8c0d-dd76da1f02a5">Not started</Status>
+    <_ip_UnifiedCompliancePolicyProperties xmlns="http://schemas.microsoft.com/sharepoint/v3" xsi:nil="true"/>
+    <ImageTagsTaxHTField xmlns="71af3243-3dd4-4a8d-8c0d-dd76da1f02a5">
+      <Terms xmlns="http://schemas.microsoft.com/office/infopath/2007/PartnerControls"/>
+    </ImageTagsTaxHTField>
+    <TaxCatchAll xmlns="230e9df3-be65-4c73-a93b-d1236ebd677e"/>
+    <MediaServiceKeyPoints xmlns="71af3243-3dd4-4a8d-8c0d-dd76da1f02a5" xsi:nil="true"/>
+  </documentManagement>
+</p:properties>
+</file>
+
+<file path=customXml/item2.xml><?xml version="1.0" encoding="utf-8"?>
+<?mso-contentType ?>
+<FormTemplates xmlns="http://schemas.microsoft.com/sharepoint/v3/contenttype/forms">
+  <Display>DocumentLibraryForm</Display>
+  <Edit>DocumentLibraryForm</Edit>
+  <New>DocumentLibraryForm</New>
+</FormTemplates>
+</file>
+
+<file path=customXml/item3.xml><?xml version="1.0" encoding="utf-8"?>
 <ct:contentTypeSchema xmlns:ct="http://schemas.microsoft.com/office/2006/metadata/contentType" xmlns:ma="http://schemas.microsoft.com/office/2006/metadata/properties/metaAttributes" ct:_="" ma:_="" ma:contentTypeName="Document" ma:contentTypeID="0x01010079F111ED35F8CC479449609E8A0923A6" ma:contentTypeVersion="20" ma:contentTypeDescription="Create a new document." ma:contentTypeScope="" ma:versionID="1267097ee5f5874adfcc408041ae252e">
   <xsd:schema xmlns:xsd="http://www.w3.org/2001/XMLSchema" xmlns:xs="http://www.w3.org/2001/XMLSchema" xmlns:p="http://schemas.microsoft.com/office/2006/metadata/properties" xmlns:ns1="http://schemas.microsoft.com/sharepoint/v3" xmlns:ns2="71af3243-3dd4-4a8d-8c0d-dd76da1f02a5" xmlns:ns3="16c05727-aa75-4e4a-9b5f-8a80a1165891" xmlns:ns4="230e9df3-be65-4c73-a93b-d1236ebd677e" targetNamespace="http://schemas.microsoft.com/office/2006/metadata/properties" ma:root="true" ma:fieldsID="395891a93df65b14727750f2c06c306c" ns1:_="" ns2:_="" ns3:_="" ns4:_="">
     <xsd:import namespace="http://schemas.microsoft.com/sharepoint/v3"/>
@@ -6847,35 +7506,27 @@
 </ct:contentTypeSchema>
 </file>
 
-<file path=customXml/item2.xml><?xml version="1.0" encoding="utf-8"?>
-<?mso-contentType ?>
-<FormTemplates xmlns="http://schemas.microsoft.com/sharepoint/v3/contenttype/forms">
-  <Display>DocumentLibraryForm</Display>
-  <Edit>DocumentLibraryForm</Edit>
-  <New>DocumentLibraryForm</New>
-</FormTemplates>
+<file path=customXml/itemProps1.xml><?xml version="1.0" encoding="utf-8"?>
+<ds:datastoreItem xmlns:ds="http://schemas.openxmlformats.org/officeDocument/2006/customXml" ds:itemID="{2045902D-8BCA-4596-9829-0D7D1289C020}">
+  <ds:schemaRefs>
+    <ds:schemaRef ds:uri="http://schemas.microsoft.com/office/2006/metadata/properties"/>
+    <ds:schemaRef ds:uri="http://schemas.microsoft.com/office/infopath/2007/PartnerControls"/>
+    <ds:schemaRef ds:uri="http://schemas.microsoft.com/sharepoint/v3"/>
+    <ds:schemaRef ds:uri="71af3243-3dd4-4a8d-8c0d-dd76da1f02a5"/>
+    <ds:schemaRef ds:uri="230e9df3-be65-4c73-a93b-d1236ebd677e"/>
+  </ds:schemaRefs>
+</ds:datastoreItem>
 </file>
 
-<file path=customXml/item3.xml><?xml version="1.0" encoding="utf-8"?>
-<p:properties xmlns:p="http://schemas.microsoft.com/office/2006/metadata/properties" xmlns:xsi="http://www.w3.org/2001/XMLSchema-instance" xmlns:pc="http://schemas.microsoft.com/office/infopath/2007/PartnerControls">
-  <documentManagement>
-    <_ip_UnifiedCompliancePolicyUIAction xmlns="http://schemas.microsoft.com/sharepoint/v3" xsi:nil="true"/>
-    <Image xmlns="71af3243-3dd4-4a8d-8c0d-dd76da1f02a5">
-      <Url xsi:nil="true"/>
-      <Description xsi:nil="true"/>
-    </Image>
-    <Status xmlns="71af3243-3dd4-4a8d-8c0d-dd76da1f02a5">Not started</Status>
-    <_ip_UnifiedCompliancePolicyProperties xmlns="http://schemas.microsoft.com/sharepoint/v3" xsi:nil="true"/>
-    <ImageTagsTaxHTField xmlns="71af3243-3dd4-4a8d-8c0d-dd76da1f02a5">
-      <Terms xmlns="http://schemas.microsoft.com/office/infopath/2007/PartnerControls"/>
-    </ImageTagsTaxHTField>
-    <TaxCatchAll xmlns="230e9df3-be65-4c73-a93b-d1236ebd677e"/>
-    <MediaServiceKeyPoints xmlns="71af3243-3dd4-4a8d-8c0d-dd76da1f02a5" xsi:nil="true"/>
-  </documentManagement>
-</p:properties>
+<file path=customXml/itemProps2.xml><?xml version="1.0" encoding="utf-8"?>
+<ds:datastoreItem xmlns:ds="http://schemas.openxmlformats.org/officeDocument/2006/customXml" ds:itemID="{AB64C1E2-42EA-4660-BCB7-94E6DA7562F1}">
+  <ds:schemaRefs>
+    <ds:schemaRef ds:uri="http://schemas.microsoft.com/sharepoint/v3/contenttype/forms"/>
+  </ds:schemaRefs>
+</ds:datastoreItem>
 </file>
 
-<file path=customXml/itemProps1.xml><?xml version="1.0" encoding="utf-8"?>
+<file path=customXml/itemProps3.xml><?xml version="1.0" encoding="utf-8"?>
 <ds:datastoreItem xmlns:ds="http://schemas.openxmlformats.org/officeDocument/2006/customXml" ds:itemID="{33879FED-67F8-481C-84BD-042483293B97}">
   <ds:schemaRefs>
     <ds:schemaRef ds:uri="http://schemas.microsoft.com/office/2006/metadata/contentType"/>
@@ -6894,24 +7545,4 @@
     <ds:schemaRef ds:uri="http://schemas.microsoft.com/internal/obd"/>
   </ds:schemaRefs>
 </ds:datastoreItem>
-</file>
-
-<file path=customXml/itemProps2.xml><?xml version="1.0" encoding="utf-8"?>
-<ds:datastoreItem xmlns:ds="http://schemas.openxmlformats.org/officeDocument/2006/customXml" ds:itemID="{AB64C1E2-42EA-4660-BCB7-94E6DA7562F1}">
-  <ds:schemaRefs>
-    <ds:schemaRef ds:uri="http://schemas.microsoft.com/sharepoint/v3/contenttype/forms"/>
-  </ds:schemaRefs>
-</ds:datastoreItem>
-</file>
-
-<file path=customXml/itemProps3.xml><?xml version="1.0" encoding="utf-8"?>
-<ds:datastoreItem xmlns:ds="http://schemas.openxmlformats.org/officeDocument/2006/customXml" ds:itemID="{2045902D-8BCA-4596-9829-0D7D1289C020}">
-  <ds:schemaRefs>
-    <ds:schemaRef ds:uri="http://schemas.microsoft.com/office/2006/metadata/properties"/>
-    <ds:schemaRef ds:uri="http://schemas.microsoft.com/office/infopath/2007/PartnerControls"/>
-    <ds:schemaRef ds:uri="http://schemas.microsoft.com/sharepoint/v3"/>
-    <ds:schemaRef ds:uri="71af3243-3dd4-4a8d-8c0d-dd76da1f02a5"/>
-    <ds:schemaRef ds:uri="230e9df3-be65-4c73-a93b-d1236ebd677e"/>
-  </ds:schemaRefs>
-</ds:datastoreItem>
 </file>
</xml_diff>